<commit_message>
Board meeting log, mask update
</commit_message>
<xml_diff>
--- a/Files/Ppt mask.pptx
+++ b/Files/Ppt mask.pptx
@@ -8,8 +8,8 @@
     <p:notesMasterId r:id="rId4"/>
   </p:notesMasterIdLst>
   <p:sldIdLst>
-    <p:sldId id="257" r:id="rId2"/>
-    <p:sldId id="258" r:id="rId3"/>
+    <p:sldId id="256" r:id="rId2"/>
+    <p:sldId id="257" r:id="rId3"/>
   </p:sldIdLst>
   <p:sldSz cx="12192000" cy="6858000"/>
   <p:notesSz cx="6858000" cy="9144000"/>
@@ -198,7 +198,7 @@
           <a:p>
             <a:fld id="{CBD02DE9-54A9-4CA7-91F3-710D21D0B6EC}" type="datetimeFigureOut">
               <a:rPr lang="en-US" smtClean="0"/>
-              <a:t>9/16/2018</a:t>
+              <a:t>10/29/2018</a:t>
             </a:fld>
             <a:endParaRPr lang="en-US" dirty="0"/>
           </a:p>
@@ -488,7 +488,7 @@
           <p:cNvPr id="8" name="Rectangle 7">
             <a:extLst>
               <a:ext uri="{FF2B5EF4-FFF2-40B4-BE49-F238E27FC236}">
-                <a16:creationId xmlns:a16="http://schemas.microsoft.com/office/drawing/2014/main" id="{53DFC5F3-BDE9-4C47-B29D-1E7EF3B0CB6A}"/>
+                <a16:creationId xmlns:a16="http://schemas.microsoft.com/office/drawing/2014/main" xmlns="" id="{53DFC5F3-BDE9-4C47-B29D-1E7EF3B0CB6A}"/>
               </a:ext>
             </a:extLst>
           </p:cNvPr>
@@ -538,7 +538,7 @@
           <p:cNvPr id="9" name="Rectangle 8">
             <a:extLst>
               <a:ext uri="{FF2B5EF4-FFF2-40B4-BE49-F238E27FC236}">
-                <a16:creationId xmlns:a16="http://schemas.microsoft.com/office/drawing/2014/main" id="{43955A2C-6DC0-42CF-8BED-5DD7424ED665}"/>
+                <a16:creationId xmlns:a16="http://schemas.microsoft.com/office/drawing/2014/main" xmlns="" id="{43955A2C-6DC0-42CF-8BED-5DD7424ED665}"/>
               </a:ext>
             </a:extLst>
           </p:cNvPr>
@@ -579,60 +579,12 @@
           </a:p>
         </p:txBody>
       </p:sp>
-      <p:sp>
-        <p:nvSpPr>
-          <p:cNvPr id="3" name="Espace réservé de la date 2">
-            <a:extLst>
-              <a:ext uri="{FF2B5EF4-FFF2-40B4-BE49-F238E27FC236}">
-                <a16:creationId xmlns:a16="http://schemas.microsoft.com/office/drawing/2014/main" id="{64AB45EF-6A17-458B-91BF-270D9BA690AB}"/>
-              </a:ext>
-            </a:extLst>
-          </p:cNvPr>
-          <p:cNvSpPr>
-            <a:spLocks noGrp="1"/>
-          </p:cNvSpPr>
-          <p:nvPr>
-            <p:ph type="dt" sz="half" idx="10"/>
-          </p:nvPr>
-        </p:nvSpPr>
-        <p:spPr>
-          <a:xfrm>
-            <a:off x="164426" y="246028"/>
-            <a:ext cx="3563526" cy="353287"/>
-          </a:xfrm>
-          <a:prstGeom prst="rect">
-            <a:avLst/>
-          </a:prstGeom>
-        </p:spPr>
-        <p:txBody>
-          <a:bodyPr/>
-          <a:lstStyle>
-            <a:lvl1pPr algn="ctr">
-              <a:defRPr>
-                <a:solidFill>
-                  <a:schemeClr val="bg1"/>
-                </a:solidFill>
-                <a:latin typeface="Arial Nova Light" panose="020B0304020202020204" pitchFamily="34" charset="0"/>
-                <a:cs typeface="Arial Nova Light" panose="020B0304020202020204" pitchFamily="34" charset="0"/>
-              </a:defRPr>
-            </a:lvl1pPr>
-          </a:lstStyle>
-          <a:p>
-            <a:fld id="{AE3F786F-BBB9-44DF-BEA8-7AA55D7286D1}" type="datetime1">
-              <a:rPr lang="en-US" smtClean="0"/>
-              <a:pPr/>
-              <a:t>9/16/2018</a:t>
-            </a:fld>
-            <a:endParaRPr lang="en-US" dirty="0"/>
-          </a:p>
-        </p:txBody>
-      </p:sp>
       <p:pic>
         <p:nvPicPr>
           <p:cNvPr id="6" name="Image 5" descr="Une image contenant extérieur&#10;&#10;Description générée avec un niveau de confiance très élevé">
             <a:extLst>
               <a:ext uri="{FF2B5EF4-FFF2-40B4-BE49-F238E27FC236}">
-                <a16:creationId xmlns:a16="http://schemas.microsoft.com/office/drawing/2014/main" id="{5514EDC0-5B5E-49A1-9FBC-EC3FCB56454E}"/>
+                <a16:creationId xmlns:a16="http://schemas.microsoft.com/office/drawing/2014/main" xmlns="" id="{5514EDC0-5B5E-49A1-9FBC-EC3FCB56454E}"/>
               </a:ext>
             </a:extLst>
           </p:cNvPr>
@@ -642,7 +594,7 @@
           <p:nvPr userDrawn="1"/>
         </p:nvPicPr>
         <p:blipFill>
-          <a:blip r:embed="rId2">
+          <a:blip r:embed="rId2" cstate="print">
             <a:extLst>
               <a:ext uri="{28A0092B-C50C-407E-A947-70E740481C1C}">
                 <a14:useLocalDpi xmlns:a14="http://schemas.microsoft.com/office/drawing/2010/main" val="0"/>
@@ -655,7 +607,7 @@
         </p:blipFill>
         <p:spPr>
           <a:xfrm>
-            <a:off x="10417484" y="-55484"/>
+            <a:off x="11158630" y="-55484"/>
             <a:ext cx="971965" cy="917535"/>
           </a:xfrm>
           <a:prstGeom prst="rect">
@@ -668,7 +620,7 @@
           <p:cNvPr id="7" name="Image 6">
             <a:extLst>
               <a:ext uri="{FF2B5EF4-FFF2-40B4-BE49-F238E27FC236}">
-                <a16:creationId xmlns:a16="http://schemas.microsoft.com/office/drawing/2014/main" id="{C77A5FE8-6DAC-44C8-85CC-4966121CD022}"/>
+                <a16:creationId xmlns:a16="http://schemas.microsoft.com/office/drawing/2014/main" xmlns="" id="{C77A5FE8-6DAC-44C8-85CC-4966121CD022}"/>
               </a:ext>
             </a:extLst>
           </p:cNvPr>
@@ -678,7 +630,7 @@
           <p:nvPr userDrawn="1"/>
         </p:nvPicPr>
         <p:blipFill>
-          <a:blip r:embed="rId3">
+          <a:blip r:embed="rId3" cstate="print">
             <a:extLst>
               <a:ext uri="{28A0092B-C50C-407E-A947-70E740481C1C}">
                 <a14:useLocalDpi xmlns:a14="http://schemas.microsoft.com/office/drawing/2010/main" val="0"/>
@@ -691,7 +643,7 @@
         </p:blipFill>
         <p:spPr>
           <a:xfrm>
-            <a:off x="9278000" y="-55484"/>
+            <a:off x="10173150" y="-55484"/>
             <a:ext cx="917535" cy="917535"/>
           </a:xfrm>
           <a:prstGeom prst="rect">
@@ -704,7 +656,7 @@
           <p:cNvPr id="10" name="Espace réservé de la date 2">
             <a:extLst>
               <a:ext uri="{FF2B5EF4-FFF2-40B4-BE49-F238E27FC236}">
-                <a16:creationId xmlns:a16="http://schemas.microsoft.com/office/drawing/2014/main" id="{377EB69A-5AC6-4363-989F-DF7DE9286C71}"/>
+                <a16:creationId xmlns:a16="http://schemas.microsoft.com/office/drawing/2014/main" xmlns="" id="{377EB69A-5AC6-4363-989F-DF7DE9286C71}"/>
               </a:ext>
             </a:extLst>
           </p:cNvPr>
@@ -833,7 +785,7 @@
           <p:cNvPr id="15" name="Espace réservé du texte 14">
             <a:extLst>
               <a:ext uri="{FF2B5EF4-FFF2-40B4-BE49-F238E27FC236}">
-                <a16:creationId xmlns:a16="http://schemas.microsoft.com/office/drawing/2014/main" id="{BC46C715-7C5F-4214-B030-2565DD90757D}"/>
+                <a16:creationId xmlns:a16="http://schemas.microsoft.com/office/drawing/2014/main" xmlns="" id="{BC46C715-7C5F-4214-B030-2565DD90757D}"/>
               </a:ext>
             </a:extLst>
           </p:cNvPr>
@@ -846,7 +798,7 @@
         </p:nvSpPr>
         <p:spPr>
           <a:xfrm>
-            <a:off x="1672166" y="3071116"/>
+            <a:off x="3164082" y="2746978"/>
             <a:ext cx="7878762" cy="864450"/>
           </a:xfrm>
           <a:prstGeom prst="rect">
@@ -868,12 +820,12 @@
           </a:lstStyle>
           <a:p>
             <a:r>
-              <a:rPr lang="en-US" sz="2800" dirty="0" err="1">
+              <a:rPr lang="en-US" sz="2800" dirty="0" smtClean="0">
                 <a:solidFill>
                   <a:schemeClr val="tx1"/>
                 </a:solidFill>
               </a:rPr>
-              <a:t>Sujet</a:t>
+              <a:t>Subject</a:t>
             </a:r>
             <a:endParaRPr lang="en-US" sz="2800" dirty="0">
               <a:solidFill>
@@ -895,7 +847,7 @@
           <p:cNvPr id="16" name="Titre 15">
             <a:extLst>
               <a:ext uri="{FF2B5EF4-FFF2-40B4-BE49-F238E27FC236}">
-                <a16:creationId xmlns:a16="http://schemas.microsoft.com/office/drawing/2014/main" id="{B3BA48C9-71C6-4674-9380-7A4667859C9A}"/>
+                <a16:creationId xmlns:a16="http://schemas.microsoft.com/office/drawing/2014/main" xmlns="" id="{B3BA48C9-71C6-4674-9380-7A4667859C9A}"/>
               </a:ext>
             </a:extLst>
           </p:cNvPr>
@@ -903,13 +855,13 @@
             <a:spLocks noGrp="1"/>
           </p:cNvSpPr>
           <p:nvPr>
-            <p:ph type="title"/>
+            <p:ph type="title" hasCustomPrompt="1"/>
           </p:nvPr>
         </p:nvSpPr>
         <p:spPr>
           <a:xfrm>
-            <a:off x="838200" y="1347485"/>
-            <a:ext cx="10515600" cy="1325563"/>
+            <a:off x="838198" y="1663879"/>
+            <a:ext cx="10515600" cy="850986"/>
           </a:xfrm>
           <a:prstGeom prst="rect">
             <a:avLst/>
@@ -920,8 +872,8 @@
             <a:normAutofit/>
           </a:bodyPr>
           <a:lstStyle>
-            <a:lvl1pPr>
-              <a:defRPr sz="4400">
+            <a:lvl1pPr algn="ctr">
+              <a:defRPr sz="4400" baseline="0">
                 <a:latin typeface="Arial Nova Light" panose="020B0304020202020204" pitchFamily="34" charset="0"/>
                 <a:cs typeface="Arial Nova Light" panose="020B0304020202020204" pitchFamily="34" charset="0"/>
               </a:defRPr>
@@ -929,8 +881,16 @@
           </a:lstStyle>
           <a:p>
             <a:r>
-              <a:rPr lang="fr-FR" dirty="0"/>
-              <a:t>Modifiez le style du titre</a:t>
+              <a:rPr lang="fr-FR" dirty="0" err="1" smtClean="0"/>
+              <a:t>Presentation</a:t>
+            </a:r>
+            <a:r>
+              <a:rPr lang="fr-FR" dirty="0" smtClean="0"/>
+              <a:t> </a:t>
+            </a:r>
+            <a:r>
+              <a:rPr lang="fr-FR" dirty="0" err="1" smtClean="0"/>
+              <a:t>Title</a:t>
             </a:r>
             <a:endParaRPr lang="en-US" dirty="0"/>
           </a:p>
@@ -941,7 +901,7 @@
           <p:cNvPr id="19" name="Rectangle 18">
             <a:extLst>
               <a:ext uri="{FF2B5EF4-FFF2-40B4-BE49-F238E27FC236}">
-                <a16:creationId xmlns:a16="http://schemas.microsoft.com/office/drawing/2014/main" id="{FA6349F9-E032-4858-9A3A-D8C111066340}"/>
+                <a16:creationId xmlns:a16="http://schemas.microsoft.com/office/drawing/2014/main" xmlns="" id="{FA6349F9-E032-4858-9A3A-D8C111066340}"/>
               </a:ext>
             </a:extLst>
           </p:cNvPr>
@@ -1006,37 +966,32 @@
       </p:sp>
       <p:sp>
         <p:nvSpPr>
-          <p:cNvPr id="25" name="Espace réservé du texte 24">
-            <a:extLst>
-              <a:ext uri="{FF2B5EF4-FFF2-40B4-BE49-F238E27FC236}">
-                <a16:creationId xmlns:a16="http://schemas.microsoft.com/office/drawing/2014/main" id="{FBE6BD17-050F-48B7-A8AC-5273B144D41D}"/>
-              </a:ext>
-            </a:extLst>
-          </p:cNvPr>
+          <p:cNvPr id="13" name="Espace réservé du texte 15"/>
           <p:cNvSpPr>
             <a:spLocks noGrp="1"/>
           </p:cNvSpPr>
           <p:nvPr>
-            <p:ph type="body" sz="quarter" idx="14" hasCustomPrompt="1"/>
+            <p:ph type="body" sz="quarter" idx="13" hasCustomPrompt="1"/>
           </p:nvPr>
         </p:nvSpPr>
         <p:spPr>
           <a:xfrm>
-            <a:off x="10417484" y="4617050"/>
-            <a:ext cx="1689479" cy="1636948"/>
+            <a:off x="62558" y="168401"/>
+            <a:ext cx="3767261" cy="469764"/>
           </a:xfrm>
           <a:prstGeom prst="rect">
             <a:avLst/>
           </a:prstGeom>
         </p:spPr>
         <p:txBody>
-          <a:bodyPr>
-            <a:normAutofit/>
-          </a:bodyPr>
+          <a:bodyPr anchor="ctr" anchorCtr="0"/>
           <a:lstStyle>
-            <a:lvl1pPr marL="0" indent="0">
+            <a:lvl1pPr marL="0" indent="0" algn="ctr">
               <a:buNone/>
-              <a:defRPr sz="1600">
+              <a:defRPr sz="1800" baseline="0">
+                <a:solidFill>
+                  <a:schemeClr val="bg1"/>
+                </a:solidFill>
                 <a:latin typeface="Arial Nova Light" panose="020B0304020202020204" pitchFamily="34" charset="0"/>
                 <a:cs typeface="Arial Nova Light" panose="020B0304020202020204" pitchFamily="34" charset="0"/>
               </a:defRPr>
@@ -1045,61 +1000,89 @@
           <a:p>
             <a:pPr lvl="0"/>
             <a:r>
-              <a:rPr lang="fr-FR" dirty="0"/>
-              <a:t>présentateurs</a:t>
+              <a:rPr lang="fr-FR" dirty="0" smtClean="0"/>
+              <a:t>Date</a:t>
             </a:r>
-            <a:endParaRPr lang="en-US" dirty="0"/>
+            <a:endParaRPr lang="fr-FR" dirty="0"/>
           </a:p>
         </p:txBody>
       </p:sp>
-      <p:sp>
-        <p:nvSpPr>
-          <p:cNvPr id="26" name="Espace réservé du texte 24">
+      <p:pic>
+        <p:nvPicPr>
+          <p:cNvPr id="14" name="Picture 2" descr="https://lh5.googleusercontent.com/LR7EV68FnLlpvf9k-RIQJ-eD5C3k31B9ByLnd4xQ6hM_oi1lk7-VIbubPEAHXzShkhCi-lXDR2bNMQC7zSu1lFnheVULs7nlMlKXqZZUrHLQlG3xizIWzOfhhgVwDNqFWk4qITlN1V4"/>
+          <p:cNvPicPr>
+            <a:picLocks noChangeAspect="1" noChangeArrowheads="1"/>
+          </p:cNvPicPr>
+          <p:nvPr userDrawn="1"/>
+        </p:nvPicPr>
+        <p:blipFill>
+          <a:blip r:embed="rId4" cstate="print">
             <a:extLst>
-              <a:ext uri="{FF2B5EF4-FFF2-40B4-BE49-F238E27FC236}">
-                <a16:creationId xmlns:a16="http://schemas.microsoft.com/office/drawing/2014/main" id="{3A5F416F-C588-4D52-87A4-E5A88E5BAD4A}"/>
+              <a:ext uri="{28A0092B-C50C-407E-A947-70E740481C1C}">
+                <a14:useLocalDpi xmlns:a14="http://schemas.microsoft.com/office/drawing/2010/main" val="0"/>
               </a:ext>
             </a:extLst>
-          </p:cNvPr>
-          <p:cNvSpPr>
-            <a:spLocks noGrp="1"/>
-          </p:cNvSpPr>
-          <p:nvPr>
-            <p:ph type="body" sz="quarter" idx="15" hasCustomPrompt="1"/>
-          </p:nvPr>
-        </p:nvSpPr>
-        <p:spPr>
+          </a:blip>
+          <a:srcRect/>
+          <a:stretch>
+            <a:fillRect/>
+          </a:stretch>
+        </p:blipFill>
+        <p:spPr bwMode="auto">
           <a:xfrm>
-            <a:off x="9401842" y="5211731"/>
-            <a:ext cx="499168" cy="388747"/>
+            <a:off x="8456588" y="-125139"/>
+            <a:ext cx="1091672" cy="1091672"/>
           </a:xfrm>
           <a:prstGeom prst="rect">
             <a:avLst/>
           </a:prstGeom>
+          <a:noFill/>
+          <a:extLst>
+            <a:ext uri="{909E8E84-426E-40DD-AFC4-6F175D3DCCD1}">
+              <a14:hiddenFill xmlns:a14="http://schemas.microsoft.com/office/drawing/2010/main">
+                <a:solidFill>
+                  <a:srgbClr val="FFFFFF"/>
+                </a:solidFill>
+              </a14:hiddenFill>
+            </a:ext>
+          </a:extLst>
         </p:spPr>
-        <p:txBody>
-          <a:bodyPr>
-            <a:normAutofit/>
-          </a:bodyPr>
-          <a:lstStyle>
-            <a:lvl1pPr marL="0" indent="0">
-              <a:buNone/>
-              <a:defRPr sz="1600">
-                <a:latin typeface="Arial Nova Light" panose="020B0304020202020204" pitchFamily="34" charset="0"/>
-                <a:cs typeface="Arial Nova Light" panose="020B0304020202020204" pitchFamily="34" charset="0"/>
-              </a:defRPr>
-            </a:lvl1pPr>
-          </a:lstStyle>
-          <a:p>
-            <a:pPr lvl="0"/>
-            <a:r>
-              <a:rPr lang="fr-FR" dirty="0"/>
-              <a:t>par</a:t>
-            </a:r>
-            <a:endParaRPr lang="en-US" dirty="0"/>
-          </a:p>
-        </p:txBody>
-      </p:sp>
+      </p:pic>
+      <p:cxnSp>
+        <p:nvCxnSpPr>
+          <p:cNvPr id="4" name="Connecteur droit 3"/>
+          <p:cNvCxnSpPr/>
+          <p:nvPr userDrawn="1"/>
+        </p:nvCxnSpPr>
+        <p:spPr>
+          <a:xfrm>
+            <a:off x="9706701" y="0"/>
+            <a:ext cx="9625" cy="862051"/>
+          </a:xfrm>
+          <a:prstGeom prst="line">
+            <a:avLst/>
+          </a:prstGeom>
+          <a:ln>
+            <a:solidFill>
+              <a:schemeClr val="bg1"/>
+            </a:solidFill>
+          </a:ln>
+        </p:spPr>
+        <p:style>
+          <a:lnRef idx="1">
+            <a:schemeClr val="accent1"/>
+          </a:lnRef>
+          <a:fillRef idx="0">
+            <a:schemeClr val="accent1"/>
+          </a:fillRef>
+          <a:effectRef idx="0">
+            <a:schemeClr val="accent1"/>
+          </a:effectRef>
+          <a:fontRef idx="minor">
+            <a:schemeClr val="tx1"/>
+          </a:fontRef>
+        </p:style>
+      </p:cxnSp>
     </p:spTree>
     <p:extLst>
       <p:ext uri="{BB962C8B-B14F-4D97-AF65-F5344CB8AC3E}">
@@ -1114,7 +1097,7 @@
 </file>
 
 <file path=ppt/slideLayouts/slideLayout2.xml><?xml version="1.0" encoding="utf-8"?>
-<p:sldLayout xmlns:a="http://schemas.openxmlformats.org/drawingml/2006/main" xmlns:r="http://schemas.openxmlformats.org/officeDocument/2006/relationships" xmlns:p="http://schemas.openxmlformats.org/presentationml/2006/main" type="title" preserve="1">
+<p:sldLayout xmlns:a="http://schemas.openxmlformats.org/drawingml/2006/main" xmlns:r="http://schemas.openxmlformats.org/officeDocument/2006/relationships" xmlns:p="http://schemas.openxmlformats.org/presentationml/2006/main" preserve="1" userDrawn="1">
   <p:cSld name="Corps">
     <p:spTree>
       <p:nvGrpSpPr>
@@ -1135,7 +1118,7 @@
           <p:cNvPr id="7" name="Rectangle 6">
             <a:extLst>
               <a:ext uri="{FF2B5EF4-FFF2-40B4-BE49-F238E27FC236}">
-                <a16:creationId xmlns:a16="http://schemas.microsoft.com/office/drawing/2014/main" id="{BFB037AB-4A66-4EAE-9FB1-662CC52AC4BA}"/>
+                <a16:creationId xmlns:a16="http://schemas.microsoft.com/office/drawing/2014/main" xmlns="" id="{BFB037AB-4A66-4EAE-9FB1-662CC52AC4BA}"/>
               </a:ext>
             </a:extLst>
           </p:cNvPr>
@@ -1185,7 +1168,7 @@
           <p:cNvPr id="8" name="Groupe 7">
             <a:extLst>
               <a:ext uri="{FF2B5EF4-FFF2-40B4-BE49-F238E27FC236}">
-                <a16:creationId xmlns:a16="http://schemas.microsoft.com/office/drawing/2014/main" id="{6C51E171-9D69-4EF7-A7CD-795196410CBC}"/>
+                <a16:creationId xmlns:a16="http://schemas.microsoft.com/office/drawing/2014/main" xmlns="" id="{6C51E171-9D69-4EF7-A7CD-795196410CBC}"/>
               </a:ext>
             </a:extLst>
           </p:cNvPr>
@@ -1194,10 +1177,10 @@
         </p:nvGrpSpPr>
         <p:grpSpPr>
           <a:xfrm>
-            <a:off x="8883603" y="-43826"/>
-            <a:ext cx="3120669" cy="1273120"/>
-            <a:chOff x="9071331" y="-43826"/>
-            <a:chExt cx="3120669" cy="1273120"/>
+            <a:off x="9615638" y="-2664"/>
+            <a:ext cx="2388623" cy="1231958"/>
+            <a:chOff x="8967390" y="-2664"/>
+            <a:chExt cx="3224610" cy="1231958"/>
           </a:xfrm>
         </p:grpSpPr>
         <p:sp>
@@ -1205,7 +1188,7 @@
             <p:cNvPr id="9" name="Parallélogramme 8">
               <a:extLst>
                 <a:ext uri="{FF2B5EF4-FFF2-40B4-BE49-F238E27FC236}">
-                  <a16:creationId xmlns:a16="http://schemas.microsoft.com/office/drawing/2014/main" id="{31941D54-8960-4DF0-8480-5AD1E0A4A8B3}"/>
+                  <a16:creationId xmlns:a16="http://schemas.microsoft.com/office/drawing/2014/main" xmlns="" id="{31941D54-8960-4DF0-8480-5AD1E0A4A8B3}"/>
                 </a:ext>
               </a:extLst>
             </p:cNvPr>
@@ -1254,84 +1237,12 @@
             </a:p>
           </p:txBody>
         </p:sp>
-        <p:pic>
-          <p:nvPicPr>
-            <p:cNvPr id="10" name="Image 9" descr="Une image contenant extérieur&#10;&#10;Description générée avec un niveau de confiance très élevé">
-              <a:extLst>
-                <a:ext uri="{FF2B5EF4-FFF2-40B4-BE49-F238E27FC236}">
-                  <a16:creationId xmlns:a16="http://schemas.microsoft.com/office/drawing/2014/main" id="{07AAA60E-900F-4F20-9E65-8A59BFA71160}"/>
-                </a:ext>
-              </a:extLst>
-            </p:cNvPr>
-            <p:cNvPicPr>
-              <a:picLocks noChangeAspect="1"/>
-            </p:cNvPicPr>
-            <p:nvPr userDrawn="1"/>
-          </p:nvPicPr>
-          <p:blipFill>
-            <a:blip r:embed="rId2">
-              <a:extLst>
-                <a:ext uri="{28A0092B-C50C-407E-A947-70E740481C1C}">
-                  <a14:useLocalDpi xmlns:a14="http://schemas.microsoft.com/office/drawing/2010/main" val="0"/>
-                </a:ext>
-              </a:extLst>
-            </a:blip>
-            <a:stretch>
-              <a:fillRect/>
-            </a:stretch>
-          </p:blipFill>
-          <p:spPr>
-            <a:xfrm>
-              <a:off x="10734051" y="-43826"/>
-              <a:ext cx="971965" cy="917535"/>
-            </a:xfrm>
-            <a:prstGeom prst="rect">
-              <a:avLst/>
-            </a:prstGeom>
-          </p:spPr>
-        </p:pic>
-        <p:pic>
-          <p:nvPicPr>
-            <p:cNvPr id="11" name="Image 10">
-              <a:extLst>
-                <a:ext uri="{FF2B5EF4-FFF2-40B4-BE49-F238E27FC236}">
-                  <a16:creationId xmlns:a16="http://schemas.microsoft.com/office/drawing/2014/main" id="{AF2F3C16-DF90-49D6-830D-835720DB3314}"/>
-                </a:ext>
-              </a:extLst>
-            </p:cNvPr>
-            <p:cNvPicPr>
-              <a:picLocks noChangeAspect="1"/>
-            </p:cNvPicPr>
-            <p:nvPr userDrawn="1"/>
-          </p:nvPicPr>
-          <p:blipFill>
-            <a:blip r:embed="rId3">
-              <a:extLst>
-                <a:ext uri="{28A0092B-C50C-407E-A947-70E740481C1C}">
-                  <a14:useLocalDpi xmlns:a14="http://schemas.microsoft.com/office/drawing/2010/main" val="0"/>
-                </a:ext>
-              </a:extLst>
-            </a:blip>
-            <a:stretch>
-              <a:fillRect/>
-            </a:stretch>
-          </p:blipFill>
-          <p:spPr>
-            <a:xfrm>
-              <a:off x="9912416" y="-40229"/>
-              <a:ext cx="921108" cy="921108"/>
-            </a:xfrm>
-            <a:prstGeom prst="rect">
-              <a:avLst/>
-            </a:prstGeom>
-          </p:spPr>
-        </p:pic>
         <p:sp>
           <p:nvSpPr>
             <p:cNvPr id="12" name="Parallélogramme 11">
               <a:extLst>
                 <a:ext uri="{FF2B5EF4-FFF2-40B4-BE49-F238E27FC236}">
-                  <a16:creationId xmlns:a16="http://schemas.microsoft.com/office/drawing/2014/main" id="{7E7E7C8A-8E48-48D0-AE1B-6538791686C6}"/>
+                  <a16:creationId xmlns:a16="http://schemas.microsoft.com/office/drawing/2014/main" xmlns="" id="{7E7E7C8A-8E48-48D0-AE1B-6538791686C6}"/>
                 </a:ext>
               </a:extLst>
             </p:cNvPr>
@@ -1340,8 +1251,8 @@
           </p:nvSpPr>
           <p:spPr>
             <a:xfrm>
-              <a:off x="9071331" y="873710"/>
-              <a:ext cx="2415913" cy="355584"/>
+              <a:off x="8967390" y="873710"/>
+              <a:ext cx="2260953" cy="355584"/>
             </a:xfrm>
             <a:prstGeom prst="parallelogram">
               <a:avLst>
@@ -1377,7 +1288,7 @@
             <a:p>
               <a:pPr algn="ctr"/>
               <a:r>
-                <a:rPr lang="fr-FR" dirty="0">
+                <a:rPr lang="fr-FR" sz="1700" dirty="0">
                   <a:solidFill>
                     <a:srgbClr val="C00000"/>
                   </a:solidFill>
@@ -1385,7 +1296,7 @@
                 </a:rPr>
                 <a:t>TOLOSAT</a:t>
               </a:r>
-              <a:endParaRPr lang="en-US" dirty="0">
+              <a:endParaRPr lang="en-US" sz="1700" dirty="0">
                 <a:solidFill>
                   <a:srgbClr val="C00000"/>
                 </a:solidFill>
@@ -1400,7 +1311,7 @@
           <p:cNvPr id="2" name="Titre 1">
             <a:extLst>
               <a:ext uri="{FF2B5EF4-FFF2-40B4-BE49-F238E27FC236}">
-                <a16:creationId xmlns:a16="http://schemas.microsoft.com/office/drawing/2014/main" id="{7E4F59EC-0E6A-4643-93CA-F87449FACD6A}"/>
+                <a16:creationId xmlns:a16="http://schemas.microsoft.com/office/drawing/2014/main" xmlns="" id="{7E4F59EC-0E6A-4643-93CA-F87449FACD6A}"/>
               </a:ext>
             </a:extLst>
           </p:cNvPr>
@@ -1444,7 +1355,7 @@
           <p:cNvPr id="3" name="Sous-titre 2">
             <a:extLst>
               <a:ext uri="{FF2B5EF4-FFF2-40B4-BE49-F238E27FC236}">
-                <a16:creationId xmlns:a16="http://schemas.microsoft.com/office/drawing/2014/main" id="{A5838F80-0A19-44AD-BA2C-E69868960852}"/>
+                <a16:creationId xmlns:a16="http://schemas.microsoft.com/office/drawing/2014/main" xmlns="" id="{A5838F80-0A19-44AD-BA2C-E69868960852}"/>
               </a:ext>
             </a:extLst>
           </p:cNvPr>
@@ -1521,7 +1432,7 @@
           <p:cNvPr id="4" name="Espace réservé de la date 3">
             <a:extLst>
               <a:ext uri="{FF2B5EF4-FFF2-40B4-BE49-F238E27FC236}">
-                <a16:creationId xmlns:a16="http://schemas.microsoft.com/office/drawing/2014/main" id="{DDFEBEF4-66BD-447C-ADB2-5043A8CA7926}"/>
+                <a16:creationId xmlns:a16="http://schemas.microsoft.com/office/drawing/2014/main" xmlns="" id="{DDFEBEF4-66BD-447C-ADB2-5043A8CA7926}"/>
               </a:ext>
             </a:extLst>
           </p:cNvPr>
@@ -1555,51 +1466,8 @@
           <a:p>
             <a:fld id="{315BE287-C7AC-4642-9718-50EAE9542224}" type="datetime1">
               <a:rPr lang="en-US" smtClean="0"/>
-              <a:t>9/16/2018</a:t>
+              <a:t>10/29/2018</a:t>
             </a:fld>
-            <a:endParaRPr lang="en-US" dirty="0"/>
-          </a:p>
-        </p:txBody>
-      </p:sp>
-      <p:sp>
-        <p:nvSpPr>
-          <p:cNvPr id="5" name="Espace réservé du pied de page 4">
-            <a:extLst>
-              <a:ext uri="{FF2B5EF4-FFF2-40B4-BE49-F238E27FC236}">
-                <a16:creationId xmlns:a16="http://schemas.microsoft.com/office/drawing/2014/main" id="{48031BC2-2D91-49EA-9603-2CA0AF8C5532}"/>
-              </a:ext>
-            </a:extLst>
-          </p:cNvPr>
-          <p:cNvSpPr>
-            <a:spLocks noGrp="1"/>
-          </p:cNvSpPr>
-          <p:nvPr>
-            <p:ph type="ftr" sz="quarter" idx="11"/>
-          </p:nvPr>
-        </p:nvSpPr>
-        <p:spPr>
-          <a:xfrm>
-            <a:off x="4038600" y="6356350"/>
-            <a:ext cx="4114800" cy="365125"/>
-          </a:xfrm>
-          <a:prstGeom prst="rect">
-            <a:avLst/>
-          </a:prstGeom>
-        </p:spPr>
-        <p:txBody>
-          <a:bodyPr/>
-          <a:lstStyle>
-            <a:lvl1pPr>
-              <a:defRPr>
-                <a:solidFill>
-                  <a:schemeClr val="bg1"/>
-                </a:solidFill>
-                <a:latin typeface="Arial Nova Light" panose="020B0304020202020204" pitchFamily="34" charset="0"/>
-                <a:cs typeface="Arial Nova Light" panose="020B0304020202020204" pitchFamily="34" charset="0"/>
-              </a:defRPr>
-            </a:lvl1pPr>
-          </a:lstStyle>
-          <a:p>
             <a:endParaRPr lang="en-US" dirty="0"/>
           </a:p>
         </p:txBody>
@@ -1609,7 +1477,7 @@
           <p:cNvPr id="6" name="Espace réservé du numéro de diapositive 5">
             <a:extLst>
               <a:ext uri="{FF2B5EF4-FFF2-40B4-BE49-F238E27FC236}">
-                <a16:creationId xmlns:a16="http://schemas.microsoft.com/office/drawing/2014/main" id="{C2DAA401-826A-4C5F-AD43-1F0AB89B4BA5}"/>
+                <a16:creationId xmlns:a16="http://schemas.microsoft.com/office/drawing/2014/main" xmlns="" id="{C2DAA401-826A-4C5F-AD43-1F0AB89B4BA5}"/>
               </a:ext>
             </a:extLst>
           </p:cNvPr>
@@ -1652,6 +1520,176 @@
           </a:p>
         </p:txBody>
       </p:sp>
+      <p:pic>
+        <p:nvPicPr>
+          <p:cNvPr id="13" name="Picture 2" descr="https://lh5.googleusercontent.com/DGltPXPb6ksRUWc8_-lXybtQmKntXr52mhVrwSyah73KY6mHdpky6A96vfpWEf4xp2DjNsbpCIlzhzglFYA-Cfa6w6ceKWXRKCMlwZAVei45pehQz_Itflyirn_POMoBD4cMkJupGAV4Byul1w"/>
+          <p:cNvPicPr>
+            <a:picLocks noChangeAspect="1" noChangeArrowheads="1"/>
+          </p:cNvPicPr>
+          <p:nvPr userDrawn="1"/>
+        </p:nvPicPr>
+        <p:blipFill rotWithShape="1">
+          <a:blip r:embed="rId2" cstate="print">
+            <a:extLst>
+              <a:ext uri="{28A0092B-C50C-407E-A947-70E740481C1C}">
+                <a14:useLocalDpi xmlns:a14="http://schemas.microsoft.com/office/drawing/2010/main" val="0"/>
+              </a:ext>
+            </a:extLst>
+          </a:blip>
+          <a:srcRect l="66582" t="43661" r="25736" b="38899"/>
+          <a:stretch/>
+        </p:blipFill>
+        <p:spPr bwMode="auto">
+          <a:xfrm>
+            <a:off x="8330304" y="6367101"/>
+            <a:ext cx="399211" cy="511711"/>
+          </a:xfrm>
+          <a:prstGeom prst="rect">
+            <a:avLst/>
+          </a:prstGeom>
+          <a:noFill/>
+          <a:extLst>
+            <a:ext uri="{909E8E84-426E-40DD-AFC4-6F175D3DCCD1}">
+              <a14:hiddenFill xmlns:a14="http://schemas.microsoft.com/office/drawing/2010/main">
+                <a:solidFill>
+                  <a:srgbClr val="FFFFFF"/>
+                </a:solidFill>
+              </a14:hiddenFill>
+            </a:ext>
+          </a:extLst>
+        </p:spPr>
+      </p:pic>
+      <p:pic>
+        <p:nvPicPr>
+          <p:cNvPr id="14" name="Picture 2" descr="https://lh5.googleusercontent.com/DGltPXPb6ksRUWc8_-lXybtQmKntXr52mhVrwSyah73KY6mHdpky6A96vfpWEf4xp2DjNsbpCIlzhzglFYA-Cfa6w6ceKWXRKCMlwZAVei45pehQz_Itflyirn_POMoBD4cMkJupGAV4Byul1w"/>
+          <p:cNvPicPr>
+            <a:picLocks noChangeAspect="1" noChangeArrowheads="1"/>
+          </p:cNvPicPr>
+          <p:nvPr userDrawn="1"/>
+        </p:nvPicPr>
+        <p:blipFill rotWithShape="1">
+          <a:blip r:embed="rId3" cstate="print">
+            <a:extLst>
+              <a:ext uri="{28A0092B-C50C-407E-A947-70E740481C1C}">
+                <a14:useLocalDpi xmlns:a14="http://schemas.microsoft.com/office/drawing/2010/main" val="0"/>
+              </a:ext>
+            </a:extLst>
+          </a:blip>
+          <a:srcRect l="20389" t="6407" r="64756" b="58326"/>
+          <a:stretch/>
+        </p:blipFill>
+        <p:spPr bwMode="auto">
+          <a:xfrm rot="172654">
+            <a:off x="11220632" y="214175"/>
+            <a:ext cx="940563" cy="1250909"/>
+          </a:xfrm>
+          <a:prstGeom prst="rect">
+            <a:avLst/>
+          </a:prstGeom>
+          <a:noFill/>
+          <a:extLst>
+            <a:ext uri="{909E8E84-426E-40DD-AFC4-6F175D3DCCD1}">
+              <a14:hiddenFill xmlns:a14="http://schemas.microsoft.com/office/drawing/2010/main">
+                <a:solidFill>
+                  <a:srgbClr val="FFFFFF"/>
+                </a:solidFill>
+              </a14:hiddenFill>
+            </a:ext>
+          </a:extLst>
+        </p:spPr>
+      </p:pic>
+      <p:sp>
+        <p:nvSpPr>
+          <p:cNvPr id="16" name="Espace réservé du texte 15"/>
+          <p:cNvSpPr>
+            <a:spLocks noGrp="1"/>
+          </p:cNvSpPr>
+          <p:nvPr>
+            <p:ph type="body" sz="quarter" idx="13" hasCustomPrompt="1"/>
+          </p:nvPr>
+        </p:nvSpPr>
+        <p:spPr>
+          <a:xfrm>
+            <a:off x="4867819" y="6327475"/>
+            <a:ext cx="3767261" cy="469764"/>
+          </a:xfrm>
+          <a:prstGeom prst="rect">
+            <a:avLst/>
+          </a:prstGeom>
+        </p:spPr>
+        <p:txBody>
+          <a:bodyPr anchor="ctr" anchorCtr="0"/>
+          <a:lstStyle>
+            <a:lvl1pPr marL="0" indent="0">
+              <a:buNone/>
+              <a:defRPr sz="1800" baseline="0">
+                <a:solidFill>
+                  <a:schemeClr val="bg1"/>
+                </a:solidFill>
+                <a:latin typeface="Arial Nova Light" panose="020B0304020202020204" pitchFamily="34" charset="0"/>
+                <a:cs typeface="Arial Nova Light" panose="020B0304020202020204" pitchFamily="34" charset="0"/>
+              </a:defRPr>
+            </a:lvl1pPr>
+          </a:lstStyle>
+          <a:p>
+            <a:pPr lvl="0"/>
+            <a:r>
+              <a:rPr lang="fr-FR" dirty="0" err="1" smtClean="0"/>
+              <a:t>Presentation</a:t>
+            </a:r>
+            <a:r>
+              <a:rPr lang="fr-FR" dirty="0" smtClean="0"/>
+              <a:t> </a:t>
+            </a:r>
+            <a:r>
+              <a:rPr lang="fr-FR" dirty="0" err="1" smtClean="0"/>
+              <a:t>title</a:t>
+            </a:r>
+            <a:endParaRPr lang="fr-FR" dirty="0"/>
+          </a:p>
+        </p:txBody>
+      </p:sp>
+      <p:pic>
+        <p:nvPicPr>
+          <p:cNvPr id="17" name="Picture 2" descr="https://lh5.googleusercontent.com/LR7EV68FnLlpvf9k-RIQJ-eD5C3k31B9ByLnd4xQ6hM_oi1lk7-VIbubPEAHXzShkhCi-lXDR2bNMQC7zSu1lFnheVULs7nlMlKXqZZUrHLQlG3xizIWzOfhhgVwDNqFWk4qITlN1V4"/>
+          <p:cNvPicPr>
+            <a:picLocks noChangeAspect="1" noChangeArrowheads="1"/>
+          </p:cNvPicPr>
+          <p:nvPr userDrawn="1"/>
+        </p:nvPicPr>
+        <p:blipFill>
+          <a:blip r:embed="rId4" cstate="print">
+            <a:extLst>
+              <a:ext uri="{28A0092B-C50C-407E-A947-70E740481C1C}">
+                <a14:useLocalDpi xmlns:a14="http://schemas.microsoft.com/office/drawing/2010/main" val="0"/>
+              </a:ext>
+            </a:extLst>
+          </a:blip>
+          <a:srcRect/>
+          <a:stretch>
+            <a:fillRect/>
+          </a:stretch>
+        </p:blipFill>
+        <p:spPr bwMode="auto">
+          <a:xfrm>
+            <a:off x="10383628" y="-107372"/>
+            <a:ext cx="1091672" cy="1091672"/>
+          </a:xfrm>
+          <a:prstGeom prst="rect">
+            <a:avLst/>
+          </a:prstGeom>
+          <a:noFill/>
+          <a:extLst>
+            <a:ext uri="{909E8E84-426E-40DD-AFC4-6F175D3DCCD1}">
+              <a14:hiddenFill xmlns:a14="http://schemas.microsoft.com/office/drawing/2010/main">
+                <a:solidFill>
+                  <a:srgbClr val="FFFFFF"/>
+                </a:solidFill>
+              </a14:hiddenFill>
+            </a:ext>
+          </a:extLst>
+        </p:spPr>
+      </p:pic>
     </p:spTree>
     <p:extLst>
       <p:ext uri="{BB962C8B-B14F-4D97-AF65-F5344CB8AC3E}">
@@ -2002,13 +2040,7 @@
       </p:grpSpPr>
       <p:sp>
         <p:nvSpPr>
-          <p:cNvPr id="6" name="Espace réservé du texte 5">
-            <a:extLst>
-              <a:ext uri="{FF2B5EF4-FFF2-40B4-BE49-F238E27FC236}">
-                <a16:creationId xmlns:a16="http://schemas.microsoft.com/office/drawing/2014/main" id="{550F6AE2-595E-4A43-AD68-BA3D409AC87C}"/>
-              </a:ext>
-            </a:extLst>
-          </p:cNvPr>
+          <p:cNvPr id="2" name="Espace réservé du texte 1"/>
           <p:cNvSpPr>
             <a:spLocks noGrp="1"/>
           </p:cNvSpPr>
@@ -2021,19 +2053,13 @@
           <a:bodyPr/>
           <a:lstStyle/>
           <a:p>
-            <a:endParaRPr lang="en-US"/>
+            <a:endParaRPr lang="fr-FR"/>
           </a:p>
         </p:txBody>
       </p:sp>
       <p:sp>
         <p:nvSpPr>
-          <p:cNvPr id="5" name="Titre 4">
-            <a:extLst>
-              <a:ext uri="{FF2B5EF4-FFF2-40B4-BE49-F238E27FC236}">
-                <a16:creationId xmlns:a16="http://schemas.microsoft.com/office/drawing/2014/main" id="{CD8B363B-8D3A-4DE6-80BC-06B9FC9E4A8A}"/>
-              </a:ext>
-            </a:extLst>
-          </p:cNvPr>
+          <p:cNvPr id="3" name="Titre 2"/>
           <p:cNvSpPr>
             <a:spLocks noGrp="1"/>
           </p:cNvSpPr>
@@ -2046,24 +2072,18 @@
           <a:bodyPr/>
           <a:lstStyle/>
           <a:p>
-            <a:endParaRPr lang="en-US" dirty="0"/>
+            <a:endParaRPr lang="fr-FR"/>
           </a:p>
         </p:txBody>
       </p:sp>
       <p:sp>
         <p:nvSpPr>
-          <p:cNvPr id="7" name="Espace réservé du texte 6">
-            <a:extLst>
-              <a:ext uri="{FF2B5EF4-FFF2-40B4-BE49-F238E27FC236}">
-                <a16:creationId xmlns:a16="http://schemas.microsoft.com/office/drawing/2014/main" id="{DF0DCB01-A8B9-4675-AAFA-22044A864AEC}"/>
-              </a:ext>
-            </a:extLst>
-          </p:cNvPr>
+          <p:cNvPr id="4" name="Espace réservé du texte 3"/>
           <p:cNvSpPr>
             <a:spLocks noGrp="1"/>
           </p:cNvSpPr>
           <p:nvPr>
-            <p:ph type="body" sz="quarter" idx="14"/>
+            <p:ph type="body" sz="quarter" idx="13"/>
           </p:nvPr>
         </p:nvSpPr>
         <p:spPr/>
@@ -2071,39 +2091,14 @@
           <a:bodyPr/>
           <a:lstStyle/>
           <a:p>
-            <a:endParaRPr lang="en-US"/>
-          </a:p>
-        </p:txBody>
-      </p:sp>
-      <p:sp>
-        <p:nvSpPr>
-          <p:cNvPr id="8" name="Espace réservé du texte 7">
-            <a:extLst>
-              <a:ext uri="{FF2B5EF4-FFF2-40B4-BE49-F238E27FC236}">
-                <a16:creationId xmlns:a16="http://schemas.microsoft.com/office/drawing/2014/main" id="{448E51ED-3E5F-49EE-9AB0-58D652FF4D82}"/>
-              </a:ext>
-            </a:extLst>
-          </p:cNvPr>
-          <p:cNvSpPr>
-            <a:spLocks noGrp="1"/>
-          </p:cNvSpPr>
-          <p:nvPr>
-            <p:ph type="body" sz="quarter" idx="15"/>
-          </p:nvPr>
-        </p:nvSpPr>
-        <p:spPr/>
-        <p:txBody>
-          <a:bodyPr/>
-          <a:lstStyle/>
-          <a:p>
-            <a:endParaRPr lang="en-US"/>
+            <a:endParaRPr lang="fr-FR"/>
           </a:p>
         </p:txBody>
       </p:sp>
     </p:spTree>
     <p:extLst>
       <p:ext uri="{BB962C8B-B14F-4D97-AF65-F5344CB8AC3E}">
-        <p14:creationId xmlns:p14="http://schemas.microsoft.com/office/powerpoint/2010/main" val="167260168"/>
+        <p14:creationId xmlns:p14="http://schemas.microsoft.com/office/powerpoint/2010/main" val="432373607"/>
       </p:ext>
     </p:extLst>
   </p:cSld>
@@ -2132,13 +2127,7 @@
       </p:grpSpPr>
       <p:sp>
         <p:nvSpPr>
-          <p:cNvPr id="5" name="Titre 4">
-            <a:extLst>
-              <a:ext uri="{FF2B5EF4-FFF2-40B4-BE49-F238E27FC236}">
-                <a16:creationId xmlns:a16="http://schemas.microsoft.com/office/drawing/2014/main" id="{93358E33-DFF8-446D-A102-EC31A7BADEEB}"/>
-              </a:ext>
-            </a:extLst>
-          </p:cNvPr>
+          <p:cNvPr id="2" name="Titre 1"/>
           <p:cNvSpPr>
             <a:spLocks noGrp="1"/>
           </p:cNvSpPr>
@@ -2151,19 +2140,13 @@
           <a:bodyPr/>
           <a:lstStyle/>
           <a:p>
-            <a:endParaRPr lang="en-US" dirty="0"/>
+            <a:endParaRPr lang="fr-FR"/>
           </a:p>
         </p:txBody>
       </p:sp>
       <p:sp>
         <p:nvSpPr>
-          <p:cNvPr id="6" name="Sous-titre 5">
-            <a:extLst>
-              <a:ext uri="{FF2B5EF4-FFF2-40B4-BE49-F238E27FC236}">
-                <a16:creationId xmlns:a16="http://schemas.microsoft.com/office/drawing/2014/main" id="{EFCB9204-1784-494C-8CE6-844421C9C6E8}"/>
-              </a:ext>
-            </a:extLst>
-          </p:cNvPr>
+          <p:cNvPr id="3" name="Sous-titre 2"/>
           <p:cNvSpPr>
             <a:spLocks noGrp="1"/>
           </p:cNvSpPr>
@@ -2176,19 +2159,13 @@
           <a:bodyPr/>
           <a:lstStyle/>
           <a:p>
-            <a:endParaRPr lang="en-US"/>
+            <a:endParaRPr lang="fr-FR"/>
           </a:p>
         </p:txBody>
       </p:sp>
       <p:sp>
         <p:nvSpPr>
-          <p:cNvPr id="4" name="Espace réservé du numéro de diapositive 3">
-            <a:extLst>
-              <a:ext uri="{FF2B5EF4-FFF2-40B4-BE49-F238E27FC236}">
-                <a16:creationId xmlns:a16="http://schemas.microsoft.com/office/drawing/2014/main" id="{C39503B1-5782-4808-AC85-2B00B8D5B1E7}"/>
-              </a:ext>
-            </a:extLst>
-          </p:cNvPr>
+          <p:cNvPr id="4" name="Espace réservé du numéro de diapositive 3"/>
           <p:cNvSpPr>
             <a:spLocks noGrp="1"/>
           </p:cNvSpPr>
@@ -2210,10 +2187,29 @@
           </a:p>
         </p:txBody>
       </p:sp>
+      <p:sp>
+        <p:nvSpPr>
+          <p:cNvPr id="5" name="Espace réservé du texte 4"/>
+          <p:cNvSpPr>
+            <a:spLocks noGrp="1"/>
+          </p:cNvSpPr>
+          <p:nvPr>
+            <p:ph type="body" sz="quarter" idx="13"/>
+          </p:nvPr>
+        </p:nvSpPr>
+        <p:spPr/>
+        <p:txBody>
+          <a:bodyPr/>
+          <a:lstStyle/>
+          <a:p>
+            <a:endParaRPr lang="fr-FR"/>
+          </a:p>
+        </p:txBody>
+      </p:sp>
     </p:spTree>
     <p:extLst>
       <p:ext uri="{BB962C8B-B14F-4D97-AF65-F5344CB8AC3E}">
-        <p14:creationId xmlns:p14="http://schemas.microsoft.com/office/powerpoint/2010/main" val="2897959152"/>
+        <p14:creationId xmlns:p14="http://schemas.microsoft.com/office/powerpoint/2010/main" val="754550713"/>
       </p:ext>
     </p:extLst>
   </p:cSld>

</xml_diff>

<commit_message>
Added log, RSS meeting presentation
</commit_message>
<xml_diff>
--- a/Files/Ppt mask.pptx
+++ b/Files/Ppt mask.pptx
@@ -5,11 +5,10 @@
     <p:sldMasterId id="2147483648" r:id="rId1"/>
   </p:sldMasterIdLst>
   <p:notesMasterIdLst>
-    <p:notesMasterId r:id="rId4"/>
+    <p:notesMasterId r:id="rId3"/>
   </p:notesMasterIdLst>
   <p:sldIdLst>
     <p:sldId id="256" r:id="rId2"/>
-    <p:sldId id="257" r:id="rId3"/>
   </p:sldIdLst>
   <p:sldSz cx="12192000" cy="6858000"/>
   <p:notesSz cx="6858000" cy="9144000"/>
@@ -198,7 +197,7 @@
           <a:p>
             <a:fld id="{CBD02DE9-54A9-4CA7-91F3-710D21D0B6EC}" type="datetimeFigureOut">
               <a:rPr lang="en-US" smtClean="0"/>
-              <a:t>10/29/2018</a:t>
+              <a:t>1/27/2019</a:t>
             </a:fld>
             <a:endParaRPr lang="en-US" dirty="0"/>
           </a:p>
@@ -1466,7 +1465,7 @@
           <a:p>
             <a:fld id="{315BE287-C7AC-4642-9718-50EAE9542224}" type="datetime1">
               <a:rPr lang="en-US" smtClean="0"/>
-              <a:t>10/29/2018</a:t>
+              <a:t>1/27/2019</a:t>
             </a:fld>
             <a:endParaRPr lang="en-US" dirty="0"/>
           </a:p>
@@ -1634,16 +1633,8 @@
           <a:p>
             <a:pPr lvl="0"/>
             <a:r>
-              <a:rPr lang="fr-FR" dirty="0" err="1" smtClean="0"/>
-              <a:t>Presentation</a:t>
-            </a:r>
-            <a:r>
               <a:rPr lang="fr-FR" dirty="0" smtClean="0"/>
-              <a:t> </a:t>
-            </a:r>
-            <a:r>
-              <a:rPr lang="fr-FR" dirty="0" err="1" smtClean="0"/>
-              <a:t>title</a:t>
+              <a:t>RSS meeting</a:t>
             </a:r>
             <a:endParaRPr lang="fr-FR" dirty="0"/>
           </a:p>
@@ -1700,6 +1691,13 @@
   <p:clrMapOvr>
     <a:masterClrMapping/>
   </p:clrMapOvr>
+  <p:timing>
+    <p:tnLst>
+      <p:par>
+        <p:cTn id="1" dur="indefinite" restart="never" nodeType="tmRoot"/>
+      </p:par>
+    </p:tnLst>
+  </p:timing>
 </p:sldLayout>
 </file>
 
@@ -2040,26 +2038,7 @@
       </p:grpSpPr>
       <p:sp>
         <p:nvSpPr>
-          <p:cNvPr id="2" name="Espace réservé du texte 1"/>
-          <p:cNvSpPr>
-            <a:spLocks noGrp="1"/>
-          </p:cNvSpPr>
-          <p:nvPr>
-            <p:ph type="body" sz="quarter" idx="12"/>
-          </p:nvPr>
-        </p:nvSpPr>
-        <p:spPr/>
-        <p:txBody>
-          <a:bodyPr/>
-          <a:lstStyle/>
-          <a:p>
-            <a:endParaRPr lang="fr-FR"/>
-          </a:p>
-        </p:txBody>
-      </p:sp>
-      <p:sp>
-        <p:nvSpPr>
-          <p:cNvPr id="3" name="Titre 2"/>
+          <p:cNvPr id="2" name="Titre 1"/>
           <p:cNvSpPr>
             <a:spLocks noGrp="1"/>
           </p:cNvSpPr>
@@ -2078,7 +2057,7 @@
       </p:sp>
       <p:sp>
         <p:nvSpPr>
-          <p:cNvPr id="4" name="Espace réservé du texte 3"/>
+          <p:cNvPr id="5" name="Espace réservé du texte 4"/>
           <p:cNvSpPr>
             <a:spLocks noGrp="1"/>
           </p:cNvSpPr>
@@ -2105,117 +2084,13 @@
   <p:clrMapOvr>
     <a:masterClrMapping/>
   </p:clrMapOvr>
-</p:sld>
-</file>
-
-<file path=ppt/slides/slide2.xml><?xml version="1.0" encoding="utf-8"?>
-<p:sld xmlns:a="http://schemas.openxmlformats.org/drawingml/2006/main" xmlns:r="http://schemas.openxmlformats.org/officeDocument/2006/relationships" xmlns:p="http://schemas.openxmlformats.org/presentationml/2006/main">
-  <p:cSld>
-    <p:spTree>
-      <p:nvGrpSpPr>
-        <p:cNvPr id="1" name=""/>
-        <p:cNvGrpSpPr/>
-        <p:nvPr/>
-      </p:nvGrpSpPr>
-      <p:grpSpPr>
-        <a:xfrm>
-          <a:off x="0" y="0"/>
-          <a:ext cx="0" cy="0"/>
-          <a:chOff x="0" y="0"/>
-          <a:chExt cx="0" cy="0"/>
-        </a:xfrm>
-      </p:grpSpPr>
-      <p:sp>
-        <p:nvSpPr>
-          <p:cNvPr id="2" name="Titre 1"/>
-          <p:cNvSpPr>
-            <a:spLocks noGrp="1"/>
-          </p:cNvSpPr>
-          <p:nvPr>
-            <p:ph type="ctrTitle"/>
-          </p:nvPr>
-        </p:nvSpPr>
-        <p:spPr/>
-        <p:txBody>
-          <a:bodyPr/>
-          <a:lstStyle/>
-          <a:p>
-            <a:endParaRPr lang="fr-FR"/>
-          </a:p>
-        </p:txBody>
-      </p:sp>
-      <p:sp>
-        <p:nvSpPr>
-          <p:cNvPr id="3" name="Sous-titre 2"/>
-          <p:cNvSpPr>
-            <a:spLocks noGrp="1"/>
-          </p:cNvSpPr>
-          <p:nvPr>
-            <p:ph type="subTitle" idx="1"/>
-          </p:nvPr>
-        </p:nvSpPr>
-        <p:spPr/>
-        <p:txBody>
-          <a:bodyPr/>
-          <a:lstStyle/>
-          <a:p>
-            <a:endParaRPr lang="fr-FR"/>
-          </a:p>
-        </p:txBody>
-      </p:sp>
-      <p:sp>
-        <p:nvSpPr>
-          <p:cNvPr id="4" name="Espace réservé du numéro de diapositive 3"/>
-          <p:cNvSpPr>
-            <a:spLocks noGrp="1"/>
-          </p:cNvSpPr>
-          <p:nvPr>
-            <p:ph type="sldNum" sz="quarter" idx="12"/>
-          </p:nvPr>
-        </p:nvSpPr>
-        <p:spPr/>
-        <p:txBody>
-          <a:bodyPr/>
-          <a:lstStyle/>
-          <a:p>
-            <a:fld id="{9E937E72-11F5-44A2-9DC0-74EEC05A6D21}" type="slidenum">
-              <a:rPr lang="en-US" smtClean="0"/>
-              <a:pPr/>
-              <a:t>2</a:t>
-            </a:fld>
-            <a:endParaRPr lang="en-US" dirty="0"/>
-          </a:p>
-        </p:txBody>
-      </p:sp>
-      <p:sp>
-        <p:nvSpPr>
-          <p:cNvPr id="5" name="Espace réservé du texte 4"/>
-          <p:cNvSpPr>
-            <a:spLocks noGrp="1"/>
-          </p:cNvSpPr>
-          <p:nvPr>
-            <p:ph type="body" sz="quarter" idx="13"/>
-          </p:nvPr>
-        </p:nvSpPr>
-        <p:spPr/>
-        <p:txBody>
-          <a:bodyPr/>
-          <a:lstStyle/>
-          <a:p>
-            <a:endParaRPr lang="fr-FR"/>
-          </a:p>
-        </p:txBody>
-      </p:sp>
-    </p:spTree>
-    <p:extLst>
-      <p:ext uri="{BB962C8B-B14F-4D97-AF65-F5344CB8AC3E}">
-        <p14:creationId xmlns:p14="http://schemas.microsoft.com/office/powerpoint/2010/main" val="754550713"/>
-      </p:ext>
-    </p:extLst>
-  </p:cSld>
-  <p:clrMapOvr>
-    <a:masterClrMapping/>
-  </p:clrMapOvr>
+  <p:timing>
+    <p:tnLst>
+      <p:par>
+        <p:cTn id="1" dur="indefinite" restart="never" nodeType="tmRoot"/>
+      </p:par>
+    </p:tnLst>
+  </p:timing>
 </p:sld>
 </file>
 

</xml_diff>